<commit_message>
DG changes for display and clear commands
</commit_message>
<xml_diff>
--- a/docs/slides/Clear.pptx
+++ b/docs/slides/Clear.pptx
@@ -192,7 +192,7 @@
           <a:p>
             <a:fld id="{0BAC29A3-F74A-4A0E-BAC1-D5DFC749CF00}" type="datetimeFigureOut">
               <a:rPr lang="en-SG" smtClean="0"/>
-              <a:t>27/3/2020</a:t>
+              <a:t>3/4/2020</a:t>
             </a:fld>
             <a:endParaRPr lang="en-SG"/>
           </a:p>
@@ -741,7 +741,7 @@
           <a:p>
             <a:fld id="{9B83C82E-27F5-4045-82EE-E026C617D232}" type="datetimeFigureOut">
               <a:rPr lang="en-SG" smtClean="0"/>
-              <a:t>27/3/2020</a:t>
+              <a:t>3/4/2020</a:t>
             </a:fld>
             <a:endParaRPr lang="en-SG"/>
           </a:p>
@@ -911,7 +911,7 @@
           <a:p>
             <a:fld id="{9B83C82E-27F5-4045-82EE-E026C617D232}" type="datetimeFigureOut">
               <a:rPr lang="en-SG" smtClean="0"/>
-              <a:t>27/3/2020</a:t>
+              <a:t>3/4/2020</a:t>
             </a:fld>
             <a:endParaRPr lang="en-SG"/>
           </a:p>
@@ -1091,7 +1091,7 @@
           <a:p>
             <a:fld id="{9B83C82E-27F5-4045-82EE-E026C617D232}" type="datetimeFigureOut">
               <a:rPr lang="en-SG" smtClean="0"/>
-              <a:t>27/3/2020</a:t>
+              <a:t>3/4/2020</a:t>
             </a:fld>
             <a:endParaRPr lang="en-SG"/>
           </a:p>
@@ -1261,7 +1261,7 @@
           <a:p>
             <a:fld id="{9B83C82E-27F5-4045-82EE-E026C617D232}" type="datetimeFigureOut">
               <a:rPr lang="en-SG" smtClean="0"/>
-              <a:t>27/3/2020</a:t>
+              <a:t>3/4/2020</a:t>
             </a:fld>
             <a:endParaRPr lang="en-SG"/>
           </a:p>
@@ -1507,7 +1507,7 @@
           <a:p>
             <a:fld id="{9B83C82E-27F5-4045-82EE-E026C617D232}" type="datetimeFigureOut">
               <a:rPr lang="en-SG" smtClean="0"/>
-              <a:t>27/3/2020</a:t>
+              <a:t>3/4/2020</a:t>
             </a:fld>
             <a:endParaRPr lang="en-SG"/>
           </a:p>
@@ -1795,7 +1795,7 @@
           <a:p>
             <a:fld id="{9B83C82E-27F5-4045-82EE-E026C617D232}" type="datetimeFigureOut">
               <a:rPr lang="en-SG" smtClean="0"/>
-              <a:t>27/3/2020</a:t>
+              <a:t>3/4/2020</a:t>
             </a:fld>
             <a:endParaRPr lang="en-SG"/>
           </a:p>
@@ -2217,7 +2217,7 @@
           <a:p>
             <a:fld id="{9B83C82E-27F5-4045-82EE-E026C617D232}" type="datetimeFigureOut">
               <a:rPr lang="en-SG" smtClean="0"/>
-              <a:t>27/3/2020</a:t>
+              <a:t>3/4/2020</a:t>
             </a:fld>
             <a:endParaRPr lang="en-SG"/>
           </a:p>
@@ -2335,7 +2335,7 @@
           <a:p>
             <a:fld id="{9B83C82E-27F5-4045-82EE-E026C617D232}" type="datetimeFigureOut">
               <a:rPr lang="en-SG" smtClean="0"/>
-              <a:t>27/3/2020</a:t>
+              <a:t>3/4/2020</a:t>
             </a:fld>
             <a:endParaRPr lang="en-SG"/>
           </a:p>
@@ -2430,7 +2430,7 @@
           <a:p>
             <a:fld id="{9B83C82E-27F5-4045-82EE-E026C617D232}" type="datetimeFigureOut">
               <a:rPr lang="en-SG" smtClean="0"/>
-              <a:t>27/3/2020</a:t>
+              <a:t>3/4/2020</a:t>
             </a:fld>
             <a:endParaRPr lang="en-SG"/>
           </a:p>
@@ -2707,7 +2707,7 @@
           <a:p>
             <a:fld id="{9B83C82E-27F5-4045-82EE-E026C617D232}" type="datetimeFigureOut">
               <a:rPr lang="en-SG" smtClean="0"/>
-              <a:t>27/3/2020</a:t>
+              <a:t>3/4/2020</a:t>
             </a:fld>
             <a:endParaRPr lang="en-SG"/>
           </a:p>
@@ -2960,7 +2960,7 @@
           <a:p>
             <a:fld id="{9B83C82E-27F5-4045-82EE-E026C617D232}" type="datetimeFigureOut">
               <a:rPr lang="en-SG" smtClean="0"/>
-              <a:t>27/3/2020</a:t>
+              <a:t>3/4/2020</a:t>
             </a:fld>
             <a:endParaRPr lang="en-SG"/>
           </a:p>
@@ -3173,7 +3173,7 @@
           <a:p>
             <a:fld id="{9B83C82E-27F5-4045-82EE-E026C617D232}" type="datetimeFigureOut">
               <a:rPr lang="en-SG" smtClean="0"/>
-              <a:t>27/3/2020</a:t>
+              <a:t>3/4/2020</a:t>
             </a:fld>
             <a:endParaRPr lang="en-SG"/>
           </a:p>
@@ -3557,9 +3557,9 @@
           <p:nvPr/>
         </p:nvSpPr>
         <p:spPr bwMode="auto">
-          <a:xfrm flipH="1">
-            <a:off x="723645" y="1440949"/>
-            <a:ext cx="5124" cy="4822691"/>
+          <a:xfrm>
+            <a:off x="728768" y="1440949"/>
+            <a:ext cx="1" cy="5156403"/>
           </a:xfrm>
           <a:prstGeom prst="line">
             <a:avLst/>
@@ -3675,62 +3675,6 @@
       </p:sp>
       <p:sp>
         <p:nvSpPr>
-          <p:cNvPr id="17" name="Rectangle 16"/>
-          <p:cNvSpPr/>
-          <p:nvPr/>
-        </p:nvSpPr>
-        <p:spPr>
-          <a:xfrm>
-            <a:off x="603890" y="1721228"/>
-            <a:ext cx="225619" cy="4222372"/>
-          </a:xfrm>
-          <a:prstGeom prst="rect">
-            <a:avLst/>
-          </a:prstGeom>
-          <a:solidFill>
-            <a:schemeClr val="accent2">
-              <a:lumMod val="40000"/>
-              <a:lumOff val="60000"/>
-            </a:schemeClr>
-          </a:solidFill>
-          <a:ln>
-            <a:solidFill>
-              <a:schemeClr val="accent2">
-                <a:lumMod val="60000"/>
-                <a:lumOff val="40000"/>
-              </a:schemeClr>
-            </a:solidFill>
-          </a:ln>
-        </p:spPr>
-        <p:style>
-          <a:lnRef idx="2">
-            <a:schemeClr val="accent4"/>
-          </a:lnRef>
-          <a:fillRef idx="1">
-            <a:schemeClr val="lt1"/>
-          </a:fillRef>
-          <a:effectRef idx="0">
-            <a:schemeClr val="accent4"/>
-          </a:effectRef>
-          <a:fontRef idx="minor">
-            <a:schemeClr val="dk1"/>
-          </a:fontRef>
-        </p:style>
-        <p:txBody>
-          <a:bodyPr rtlCol="0" anchor="ctr"/>
-          <a:lstStyle/>
-          <a:p>
-            <a:pPr algn="ctr" defTabSz="872733"/>
-            <a:endParaRPr lang="en-US" sz="1500">
-              <a:solidFill>
-                <a:prstClr val="black"/>
-              </a:solidFill>
-            </a:endParaRPr>
-          </a:p>
-        </p:txBody>
-      </p:sp>
-      <p:sp>
-        <p:nvSpPr>
           <p:cNvPr id="18" name="Text Box 11"/>
           <p:cNvSpPr txBox="1">
             <a:spLocks noChangeArrowheads="1"/>
@@ -3811,8 +3755,8 @@
         </p:nvSpPr>
         <p:spPr bwMode="auto">
           <a:xfrm flipH="1">
-            <a:off x="3018095" y="2137789"/>
-            <a:ext cx="8589" cy="1590924"/>
+            <a:off x="3026682" y="2137788"/>
+            <a:ext cx="1" cy="1675249"/>
           </a:xfrm>
           <a:prstGeom prst="line">
             <a:avLst/>
@@ -3865,8 +3809,8 @@
         </p:nvSpPr>
         <p:spPr bwMode="auto">
           <a:xfrm flipV="1">
-            <a:off x="823868" y="1898263"/>
-            <a:ext cx="1747815" cy="12191"/>
+            <a:off x="728770" y="1898262"/>
+            <a:ext cx="1842914" cy="0"/>
           </a:xfrm>
           <a:prstGeom prst="line">
             <a:avLst/>
@@ -3904,7 +3848,7 @@
         </p:nvSpPr>
         <p:spPr bwMode="auto">
           <a:xfrm>
-            <a:off x="6026594" y="3976518"/>
+            <a:off x="6026594" y="4026550"/>
             <a:ext cx="1000462" cy="338554"/>
           </a:xfrm>
           <a:prstGeom prst="rect">
@@ -3953,8 +3897,8 @@
         </p:nvSpPr>
         <p:spPr bwMode="auto">
           <a:xfrm flipV="1">
-            <a:off x="3194468" y="3104093"/>
-            <a:ext cx="1491746" cy="5837"/>
+            <a:off x="3026683" y="3104092"/>
+            <a:ext cx="1659531" cy="0"/>
           </a:xfrm>
           <a:prstGeom prst="line">
             <a:avLst/>
@@ -3994,7 +3938,7 @@
         </p:nvSpPr>
         <p:spPr bwMode="auto">
           <a:xfrm>
-            <a:off x="808004" y="2320801"/>
+            <a:off x="755576" y="2385755"/>
             <a:ext cx="2500554" cy="323165"/>
           </a:xfrm>
           <a:prstGeom prst="rect">
@@ -4153,8 +4097,8 @@
         </p:nvSpPr>
         <p:spPr bwMode="auto">
           <a:xfrm flipV="1">
-            <a:off x="863760" y="2696243"/>
-            <a:ext cx="2040971" cy="1"/>
+            <a:off x="728770" y="2696242"/>
+            <a:ext cx="2287970" cy="0"/>
           </a:xfrm>
           <a:prstGeom prst="line">
             <a:avLst/>
@@ -4228,65 +4172,10 @@
       </p:sp>
       <p:sp>
         <p:nvSpPr>
-          <p:cNvPr id="40" name="Rectangle 39"/>
-          <p:cNvSpPr/>
-          <p:nvPr/>
-        </p:nvSpPr>
-        <p:spPr>
-          <a:xfrm>
-            <a:off x="5358859" y="4066313"/>
-            <a:ext cx="251361" cy="1370068"/>
-          </a:xfrm>
-          <a:prstGeom prst="rect">
-            <a:avLst/>
-          </a:prstGeom>
-          <a:solidFill>
-            <a:schemeClr val="accent3">
-              <a:lumMod val="20000"/>
-              <a:lumOff val="80000"/>
-            </a:schemeClr>
-          </a:solidFill>
-          <a:ln>
-            <a:solidFill>
-              <a:schemeClr val="accent3">
-                <a:lumMod val="75000"/>
-              </a:schemeClr>
-            </a:solidFill>
-          </a:ln>
-        </p:spPr>
-        <p:style>
-          <a:lnRef idx="2">
-            <a:schemeClr val="accent4"/>
-          </a:lnRef>
-          <a:fillRef idx="1">
-            <a:schemeClr val="lt1"/>
-          </a:fillRef>
-          <a:effectRef idx="0">
-            <a:schemeClr val="accent4"/>
-          </a:effectRef>
-          <a:fontRef idx="minor">
-            <a:schemeClr val="dk1"/>
-          </a:fontRef>
-        </p:style>
-        <p:txBody>
-          <a:bodyPr rtlCol="0" anchor="ctr"/>
-          <a:lstStyle/>
-          <a:p>
-            <a:pPr algn="ctr" defTabSz="872733"/>
-            <a:endParaRPr lang="en-US" sz="1500">
-              <a:solidFill>
-                <a:prstClr val="black"/>
-              </a:solidFill>
-            </a:endParaRPr>
-          </a:p>
-        </p:txBody>
-      </p:sp>
-      <p:sp>
-        <p:nvSpPr>
           <p:cNvPr id="42" name="Text Box 11">
             <a:extLst>
               <a:ext uri="{FF2B5EF4-FFF2-40B4-BE49-F238E27FC236}">
-                <a16:creationId xmlns="" xmlns:a16="http://schemas.microsoft.com/office/drawing/2014/main" id="{569EC1FF-3CDF-4E6B-82B3-104CCA3F3E9D}"/>
+                <a16:creationId xmlns:a16="http://schemas.microsoft.com/office/drawing/2014/main" xmlns="" id="{569EC1FF-3CDF-4E6B-82B3-104CCA3F3E9D}"/>
               </a:ext>
             </a:extLst>
           </p:cNvPr>
@@ -4366,7 +4255,7 @@
           <p:cNvPr id="43" name="Text Box 11">
             <a:extLst>
               <a:ext uri="{FF2B5EF4-FFF2-40B4-BE49-F238E27FC236}">
-                <a16:creationId xmlns="" xmlns:a16="http://schemas.microsoft.com/office/drawing/2014/main" id="{79ACA4C9-9678-4611-AE49-25FE7CAE8B35}"/>
+                <a16:creationId xmlns:a16="http://schemas.microsoft.com/office/drawing/2014/main" xmlns="" id="{79ACA4C9-9678-4611-AE49-25FE7CAE8B35}"/>
               </a:ext>
             </a:extLst>
           </p:cNvPr>
@@ -4433,15 +4322,7 @@
                   <a:prstClr val="black"/>
                 </a:solidFill>
               </a:rPr>
-              <a:t>:</a:t>
-            </a:r>
-            <a:r>
-              <a:rPr lang="en-US" sz="1500" dirty="0" err="1" smtClean="0">
-                <a:solidFill>
-                  <a:prstClr val="black"/>
-                </a:solidFill>
-              </a:rPr>
-              <a:t>Shoco</a:t>
+              <a:t>:Duke</a:t>
             </a:r>
             <a:endParaRPr lang="en-US" sz="1500" dirty="0">
               <a:solidFill>
@@ -4453,74 +4334,13 @@
       </p:sp>
       <p:sp>
         <p:nvSpPr>
-          <p:cNvPr id="44" name="Rectangle 43">
+          <p:cNvPr id="45" name="Line 15">
             <a:extLst>
               <a:ext uri="{FF2B5EF4-FFF2-40B4-BE49-F238E27FC236}">
-                <a16:creationId xmlns="" xmlns:a16="http://schemas.microsoft.com/office/drawing/2014/main" id="{1ABAE2EE-0C6F-40C9-9F83-C6E45146189B}"/>
+                <a16:creationId xmlns:a16="http://schemas.microsoft.com/office/drawing/2014/main" xmlns="" id="{0EB24DA8-2498-4853-AED4-3458A81C456A}"/>
               </a:ext>
             </a:extLst>
           </p:cNvPr>
-          <p:cNvSpPr/>
-          <p:nvPr/>
-        </p:nvSpPr>
-        <p:spPr>
-          <a:xfrm>
-            <a:off x="2888219" y="2698465"/>
-            <a:ext cx="286905" cy="893938"/>
-          </a:xfrm>
-          <a:prstGeom prst="rect">
-            <a:avLst/>
-          </a:prstGeom>
-          <a:solidFill>
-            <a:schemeClr val="accent4">
-              <a:lumMod val="40000"/>
-              <a:lumOff val="60000"/>
-            </a:schemeClr>
-          </a:solidFill>
-          <a:ln>
-            <a:solidFill>
-              <a:schemeClr val="accent4">
-                <a:lumMod val="75000"/>
-              </a:schemeClr>
-            </a:solidFill>
-          </a:ln>
-        </p:spPr>
-        <p:style>
-          <a:lnRef idx="2">
-            <a:schemeClr val="accent4"/>
-          </a:lnRef>
-          <a:fillRef idx="1">
-            <a:schemeClr val="lt1"/>
-          </a:fillRef>
-          <a:effectRef idx="0">
-            <a:schemeClr val="accent4"/>
-          </a:effectRef>
-          <a:fontRef idx="minor">
-            <a:schemeClr val="dk1"/>
-          </a:fontRef>
-        </p:style>
-        <p:txBody>
-          <a:bodyPr rtlCol="0" anchor="ctr"/>
-          <a:lstStyle/>
-          <a:p>
-            <a:pPr algn="ctr" defTabSz="872733"/>
-            <a:endParaRPr lang="en-US" sz="1500">
-              <a:solidFill>
-                <a:prstClr val="black"/>
-              </a:solidFill>
-            </a:endParaRPr>
-          </a:p>
-        </p:txBody>
-      </p:sp>
-      <p:sp>
-        <p:nvSpPr>
-          <p:cNvPr id="45" name="Line 15">
-            <a:extLst>
-              <a:ext uri="{FF2B5EF4-FFF2-40B4-BE49-F238E27FC236}">
-                <a16:creationId xmlns="" xmlns:a16="http://schemas.microsoft.com/office/drawing/2014/main" id="{0EB24DA8-2498-4853-AED4-3458A81C456A}"/>
-              </a:ext>
-            </a:extLst>
-          </p:cNvPr>
           <p:cNvSpPr>
             <a:spLocks noChangeShapeType="1"/>
           </p:cNvSpPr>
@@ -4528,8 +4348,8 @@
         </p:nvSpPr>
         <p:spPr bwMode="auto">
           <a:xfrm>
-            <a:off x="875317" y="4066311"/>
-            <a:ext cx="4483542" cy="1"/>
+            <a:off x="728770" y="4066312"/>
+            <a:ext cx="4752564" cy="0"/>
           </a:xfrm>
           <a:prstGeom prst="line">
             <a:avLst/>
@@ -4564,7 +4384,7 @@
           <p:cNvPr id="46" name="Line 15">
             <a:extLst>
               <a:ext uri="{FF2B5EF4-FFF2-40B4-BE49-F238E27FC236}">
-                <a16:creationId xmlns="" xmlns:a16="http://schemas.microsoft.com/office/drawing/2014/main" id="{9BC66A45-C94A-4E62-8981-39EC5DACDD6D}"/>
+                <a16:creationId xmlns:a16="http://schemas.microsoft.com/office/drawing/2014/main" xmlns="" id="{9BC66A45-C94A-4E62-8981-39EC5DACDD6D}"/>
               </a:ext>
             </a:extLst>
           </p:cNvPr>
@@ -4575,8 +4395,8 @@
         </p:nvSpPr>
         <p:spPr bwMode="auto">
           <a:xfrm>
-            <a:off x="5620972" y="4365104"/>
-            <a:ext cx="1838753" cy="13864"/>
+            <a:off x="5487968" y="4365104"/>
+            <a:ext cx="2097438" cy="0"/>
           </a:xfrm>
           <a:prstGeom prst="line">
             <a:avLst/>
@@ -4611,7 +4431,7 @@
           <p:cNvPr id="47" name="Text Box 25">
             <a:extLst>
               <a:ext uri="{FF2B5EF4-FFF2-40B4-BE49-F238E27FC236}">
-                <a16:creationId xmlns="" xmlns:a16="http://schemas.microsoft.com/office/drawing/2014/main" id="{342B431E-151F-4A55-A1AE-57F6FE56D1EF}"/>
+                <a16:creationId xmlns:a16="http://schemas.microsoft.com/office/drawing/2014/main" xmlns="" id="{342B431E-151F-4A55-A1AE-57F6FE56D1EF}"/>
               </a:ext>
             </a:extLst>
           </p:cNvPr>
@@ -4666,7 +4486,7 @@
           <p:cNvPr id="48" name="Line 16">
             <a:extLst>
               <a:ext uri="{FF2B5EF4-FFF2-40B4-BE49-F238E27FC236}">
-                <a16:creationId xmlns="" xmlns:a16="http://schemas.microsoft.com/office/drawing/2014/main" id="{5278BFBC-6FA4-432C-994E-8DD2A55ED046}"/>
+                <a16:creationId xmlns:a16="http://schemas.microsoft.com/office/drawing/2014/main" xmlns="" id="{5278BFBC-6FA4-432C-994E-8DD2A55ED046}"/>
               </a:ext>
             </a:extLst>
           </p:cNvPr>
@@ -4676,9 +4496,9 @@
           <p:nvPr/>
         </p:nvSpPr>
         <p:spPr bwMode="auto">
-          <a:xfrm flipH="1">
-            <a:off x="852246" y="3573169"/>
-            <a:ext cx="2016629" cy="7945"/>
+          <a:xfrm flipH="1" flipV="1">
+            <a:off x="723645" y="3573894"/>
+            <a:ext cx="2303038" cy="7220"/>
           </a:xfrm>
           <a:prstGeom prst="line">
             <a:avLst/>
@@ -4712,7 +4532,7 @@
           <p:cNvPr id="49" name="Straight Connector 48">
             <a:extLst>
               <a:ext uri="{FF2B5EF4-FFF2-40B4-BE49-F238E27FC236}">
-                <a16:creationId xmlns="" xmlns:a16="http://schemas.microsoft.com/office/drawing/2014/main" id="{054EC965-613F-450A-BDA7-4AEF688EE06E}"/>
+                <a16:creationId xmlns:a16="http://schemas.microsoft.com/office/drawing/2014/main" xmlns="" id="{054EC965-613F-450A-BDA7-4AEF688EE06E}"/>
               </a:ext>
             </a:extLst>
           </p:cNvPr>
@@ -4755,7 +4575,7 @@
           <p:cNvPr id="50" name="Straight Connector 49">
             <a:extLst>
               <a:ext uri="{FF2B5EF4-FFF2-40B4-BE49-F238E27FC236}">
-                <a16:creationId xmlns="" xmlns:a16="http://schemas.microsoft.com/office/drawing/2014/main" id="{BCC52252-11B3-4A56-A114-AE5F1D9A8E9B}"/>
+                <a16:creationId xmlns:a16="http://schemas.microsoft.com/office/drawing/2014/main" xmlns="" id="{BCC52252-11B3-4A56-A114-AE5F1D9A8E9B}"/>
               </a:ext>
             </a:extLst>
           </p:cNvPr>
@@ -4798,7 +4618,7 @@
           <p:cNvPr id="51" name="Text Box 25">
             <a:extLst>
               <a:ext uri="{FF2B5EF4-FFF2-40B4-BE49-F238E27FC236}">
-                <a16:creationId xmlns="" xmlns:a16="http://schemas.microsoft.com/office/drawing/2014/main" id="{34020A70-184B-4A57-816D-CCE686742C10}"/>
+                <a16:creationId xmlns:a16="http://schemas.microsoft.com/office/drawing/2014/main" xmlns="" id="{34020A70-184B-4A57-816D-CCE686742C10}"/>
               </a:ext>
             </a:extLst>
           </p:cNvPr>
@@ -4809,7 +4629,7 @@
         </p:nvSpPr>
         <p:spPr bwMode="auto">
           <a:xfrm>
-            <a:off x="3685092" y="3733800"/>
+            <a:off x="3685092" y="3753907"/>
             <a:ext cx="886908" cy="323165"/>
           </a:xfrm>
           <a:prstGeom prst="rect">
@@ -4848,7 +4668,7 @@
           <p:cNvPr id="52" name="Line 13">
             <a:extLst>
               <a:ext uri="{FF2B5EF4-FFF2-40B4-BE49-F238E27FC236}">
-                <a16:creationId xmlns="" xmlns:a16="http://schemas.microsoft.com/office/drawing/2014/main" id="{C30F3633-BE5D-441D-9C87-D00C0DFC3E6D}"/>
+                <a16:creationId xmlns:a16="http://schemas.microsoft.com/office/drawing/2014/main" xmlns="" id="{C30F3633-BE5D-441D-9C87-D00C0DFC3E6D}"/>
               </a:ext>
             </a:extLst>
           </p:cNvPr>
@@ -4860,7 +4680,7 @@
         <p:spPr bwMode="auto">
           <a:xfrm>
             <a:off x="7585406" y="3674957"/>
-            <a:ext cx="1346" cy="2592151"/>
+            <a:ext cx="0" cy="2922395"/>
           </a:xfrm>
           <a:prstGeom prst="line">
             <a:avLst/>
@@ -4903,72 +4723,12 @@
           </a:p>
         </p:txBody>
       </p:sp>
-      <p:sp>
-        <p:nvSpPr>
-          <p:cNvPr id="53" name="Rectangle 52">
-            <a:extLst>
-              <a:ext uri="{FF2B5EF4-FFF2-40B4-BE49-F238E27FC236}">
-                <a16:creationId xmlns="" xmlns:a16="http://schemas.microsoft.com/office/drawing/2014/main" id="{E7397DF1-A503-43B8-9D46-710440F45D61}"/>
-              </a:ext>
-            </a:extLst>
-          </p:cNvPr>
-          <p:cNvSpPr/>
-          <p:nvPr/>
-        </p:nvSpPr>
-        <p:spPr>
-          <a:xfrm>
-            <a:off x="7459725" y="4378968"/>
-            <a:ext cx="251361" cy="697392"/>
-          </a:xfrm>
-          <a:prstGeom prst="rect">
-            <a:avLst/>
-          </a:prstGeom>
-          <a:solidFill>
-            <a:schemeClr val="bg2">
-              <a:lumMod val="75000"/>
-            </a:schemeClr>
-          </a:solidFill>
-          <a:ln>
-            <a:solidFill>
-              <a:schemeClr val="bg2">
-                <a:lumMod val="50000"/>
-              </a:schemeClr>
-            </a:solidFill>
-          </a:ln>
-        </p:spPr>
-        <p:style>
-          <a:lnRef idx="2">
-            <a:schemeClr val="accent4"/>
-          </a:lnRef>
-          <a:fillRef idx="1">
-            <a:schemeClr val="lt1"/>
-          </a:fillRef>
-          <a:effectRef idx="0">
-            <a:schemeClr val="accent4"/>
-          </a:effectRef>
-          <a:fontRef idx="minor">
-            <a:schemeClr val="dk1"/>
-          </a:fontRef>
-        </p:style>
-        <p:txBody>
-          <a:bodyPr rtlCol="0" anchor="ctr"/>
-          <a:lstStyle/>
-          <a:p>
-            <a:pPr algn="ctr" defTabSz="872733"/>
-            <a:endParaRPr lang="en-US" sz="1500">
-              <a:solidFill>
-                <a:prstClr val="black"/>
-              </a:solidFill>
-            </a:endParaRPr>
-          </a:p>
-        </p:txBody>
-      </p:sp>
       <p:cxnSp>
         <p:nvCxnSpPr>
           <p:cNvPr id="54" name="Straight Connector 53">
             <a:extLst>
               <a:ext uri="{FF2B5EF4-FFF2-40B4-BE49-F238E27FC236}">
-                <a16:creationId xmlns="" xmlns:a16="http://schemas.microsoft.com/office/drawing/2014/main" id="{BB6AEF2A-70C0-4C86-ACC0-ED4823D6AC46}"/>
+                <a16:creationId xmlns:a16="http://schemas.microsoft.com/office/drawing/2014/main" xmlns="" id="{BB6AEF2A-70C0-4C86-ACC0-ED4823D6AC46}"/>
               </a:ext>
             </a:extLst>
           </p:cNvPr>
@@ -4977,7 +4737,7 @@
         </p:nvCxnSpPr>
         <p:spPr>
           <a:xfrm rot="16200000" flipV="1">
-            <a:off x="5350471" y="5809772"/>
+            <a:off x="5339118" y="5809771"/>
             <a:ext cx="284430" cy="267655"/>
           </a:xfrm>
           <a:prstGeom prst="line">
@@ -5011,7 +4771,7 @@
           <p:cNvPr id="55" name="Straight Connector 54">
             <a:extLst>
               <a:ext uri="{FF2B5EF4-FFF2-40B4-BE49-F238E27FC236}">
-                <a16:creationId xmlns="" xmlns:a16="http://schemas.microsoft.com/office/drawing/2014/main" id="{9664B067-90B9-447F-947E-62F78A316229}"/>
+                <a16:creationId xmlns:a16="http://schemas.microsoft.com/office/drawing/2014/main" xmlns="" id="{9664B067-90B9-447F-947E-62F78A316229}"/>
               </a:ext>
             </a:extLst>
           </p:cNvPr>
@@ -5020,7 +4780,7 @@
         </p:nvCxnSpPr>
         <p:spPr>
           <a:xfrm rot="5400000">
-            <a:off x="5343881" y="5814266"/>
+            <a:off x="5336421" y="5816347"/>
             <a:ext cx="288175" cy="266007"/>
           </a:xfrm>
           <a:prstGeom prst="line">
@@ -5054,7 +4814,7 @@
           <p:cNvPr id="30" name="Line 16">
             <a:extLst>
               <a:ext uri="{FF2B5EF4-FFF2-40B4-BE49-F238E27FC236}">
-                <a16:creationId xmlns="" xmlns:a16="http://schemas.microsoft.com/office/drawing/2014/main" id="{189BA3D0-8AEC-4A1C-9374-3B627A9B1FF8}"/>
+                <a16:creationId xmlns:a16="http://schemas.microsoft.com/office/drawing/2014/main" xmlns="" id="{189BA3D0-8AEC-4A1C-9374-3B627A9B1FF8}"/>
               </a:ext>
             </a:extLst>
           </p:cNvPr>
@@ -5065,8 +4825,8 @@
         </p:nvSpPr>
         <p:spPr bwMode="auto">
           <a:xfrm flipH="1" flipV="1">
-            <a:off x="825522" y="5427032"/>
-            <a:ext cx="4533337" cy="0"/>
+            <a:off x="723644" y="5427032"/>
+            <a:ext cx="4769041" cy="0"/>
           </a:xfrm>
           <a:prstGeom prst="line">
             <a:avLst/>
@@ -5076,6 +4836,54 @@
             <a:solidFill>
               <a:schemeClr val="accent3">
                 <a:lumMod val="75000"/>
+              </a:schemeClr>
+            </a:solidFill>
+            <a:prstDash val="sysDash"/>
+            <a:round/>
+            <a:headEnd/>
+            <a:tailEnd type="triangle" w="lg" len="lg"/>
+          </a:ln>
+        </p:spPr>
+        <p:txBody>
+          <a:bodyPr/>
+          <a:lstStyle/>
+          <a:p>
+            <a:pPr defTabSz="872733"/>
+            <a:endParaRPr lang="en-US" sz="1500">
+              <a:solidFill>
+                <a:prstClr val="black"/>
+              </a:solidFill>
+            </a:endParaRPr>
+          </a:p>
+        </p:txBody>
+      </p:sp>
+      <p:sp>
+        <p:nvSpPr>
+          <p:cNvPr id="31" name="Line 16">
+            <a:extLst>
+              <a:ext uri="{FF2B5EF4-FFF2-40B4-BE49-F238E27FC236}">
+                <a16:creationId xmlns:a16="http://schemas.microsoft.com/office/drawing/2014/main" xmlns="" id="{189BA3D0-8AEC-4A1C-9374-3B627A9B1FF8}"/>
+              </a:ext>
+            </a:extLst>
+          </p:cNvPr>
+          <p:cNvSpPr>
+            <a:spLocks noChangeShapeType="1"/>
+          </p:cNvSpPr>
+          <p:nvPr/>
+        </p:nvSpPr>
+        <p:spPr bwMode="auto">
+          <a:xfrm flipH="1" flipV="1">
+            <a:off x="5487968" y="5157192"/>
+            <a:ext cx="2097438" cy="0"/>
+          </a:xfrm>
+          <a:prstGeom prst="line">
+            <a:avLst/>
+          </a:prstGeom>
+          <a:noFill/>
+          <a:ln w="19050">
+            <a:solidFill>
+              <a:schemeClr val="bg2">
+                <a:lumMod val="50000"/>
               </a:schemeClr>
             </a:solidFill>
             <a:prstDash val="sysDash"/>
@@ -5276,7 +5084,7 @@
                                           </p:stCondLst>
                                         </p:cTn>
                                         <p:tgtEl>
-                                          <p:spTgt spid="17"/>
+                                          <p:spTgt spid="18"/>
                                         </p:tgtEl>
                                         <p:attrNameLst>
                                           <p:attrName>style.visibility</p:attrName>
@@ -5303,7 +5111,7 @@
                                           </p:stCondLst>
                                         </p:cTn>
                                         <p:tgtEl>
-                                          <p:spTgt spid="18"/>
+                                          <p:spTgt spid="19"/>
                                         </p:tgtEl>
                                         <p:attrNameLst>
                                           <p:attrName>style.visibility</p:attrName>
@@ -5330,7 +5138,7 @@
                                           </p:stCondLst>
                                         </p:cTn>
                                         <p:tgtEl>
-                                          <p:spTgt spid="19"/>
+                                          <p:spTgt spid="20"/>
                                         </p:tgtEl>
                                         <p:attrNameLst>
                                           <p:attrName>style.visibility</p:attrName>
@@ -5357,7 +5165,7 @@
                                           </p:stCondLst>
                                         </p:cTn>
                                         <p:tgtEl>
-                                          <p:spTgt spid="20"/>
+                                          <p:spTgt spid="21"/>
                                         </p:tgtEl>
                                         <p:attrNameLst>
                                           <p:attrName>style.visibility</p:attrName>
@@ -5371,7 +5179,7 @@
                                 </p:cTn>
                               </p:par>
                               <p:par>
-                                <p:cTn id="23" presetID="1" presetClass="exit" presetSubtype="0" fill="hold" grpId="0" nodeType="withEffect">
+                                <p:cTn id="23" presetID="1" presetClass="exit" presetSubtype="0" fill="hold" grpId="1" nodeType="withEffect">
                                   <p:stCondLst>
                                     <p:cond delay="0"/>
                                   </p:stCondLst>
@@ -5384,7 +5192,7 @@
                                           </p:stCondLst>
                                         </p:cTn>
                                         <p:tgtEl>
-                                          <p:spTgt spid="21"/>
+                                          <p:spTgt spid="24"/>
                                         </p:tgtEl>
                                         <p:attrNameLst>
                                           <p:attrName>style.visibility</p:attrName>
@@ -5411,7 +5219,7 @@
                                           </p:stCondLst>
                                         </p:cTn>
                                         <p:tgtEl>
-                                          <p:spTgt spid="24"/>
+                                          <p:spTgt spid="25"/>
                                         </p:tgtEl>
                                         <p:attrNameLst>
                                           <p:attrName>style.visibility</p:attrName>
@@ -5438,7 +5246,7 @@
                                           </p:stCondLst>
                                         </p:cTn>
                                         <p:tgtEl>
-                                          <p:spTgt spid="25"/>
+                                          <p:spTgt spid="29"/>
                                         </p:tgtEl>
                                         <p:attrNameLst>
                                           <p:attrName>style.visibility</p:attrName>
@@ -5452,7 +5260,7 @@
                                 </p:cTn>
                               </p:par>
                               <p:par>
-                                <p:cTn id="29" presetID="1" presetClass="exit" presetSubtype="0" fill="hold" grpId="1" nodeType="withEffect">
+                                <p:cTn id="29" presetID="1" presetClass="exit" presetSubtype="0" fill="hold" grpId="0" nodeType="withEffect">
                                   <p:stCondLst>
                                     <p:cond delay="0"/>
                                   </p:stCondLst>
@@ -5465,7 +5273,7 @@
                                           </p:stCondLst>
                                         </p:cTn>
                                         <p:tgtEl>
-                                          <p:spTgt spid="29"/>
+                                          <p:spTgt spid="33"/>
                                         </p:tgtEl>
                                         <p:attrNameLst>
                                           <p:attrName>style.visibility</p:attrName>
@@ -5492,7 +5300,7 @@
                                           </p:stCondLst>
                                         </p:cTn>
                                         <p:tgtEl>
-                                          <p:spTgt spid="33"/>
+                                          <p:spTgt spid="34"/>
                                         </p:tgtEl>
                                         <p:attrNameLst>
                                           <p:attrName>style.visibility</p:attrName>
@@ -5519,7 +5327,7 @@
                                           </p:stCondLst>
                                         </p:cTn>
                                         <p:tgtEl>
-                                          <p:spTgt spid="34"/>
+                                          <p:spTgt spid="38"/>
                                         </p:tgtEl>
                                         <p:attrNameLst>
                                           <p:attrName>style.visibility</p:attrName>
@@ -5546,7 +5354,7 @@
                                           </p:stCondLst>
                                         </p:cTn>
                                         <p:tgtEl>
-                                          <p:spTgt spid="38"/>
+                                          <p:spTgt spid="42"/>
                                         </p:tgtEl>
                                         <p:attrNameLst>
                                           <p:attrName>style.visibility</p:attrName>
@@ -5573,60 +5381,6 @@
                                           </p:stCondLst>
                                         </p:cTn>
                                         <p:tgtEl>
-                                          <p:spTgt spid="40"/>
-                                        </p:tgtEl>
-                                        <p:attrNameLst>
-                                          <p:attrName>style.visibility</p:attrName>
-                                        </p:attrNameLst>
-                                      </p:cBhvr>
-                                      <p:to>
-                                        <p:strVal val="hidden"/>
-                                      </p:to>
-                                    </p:set>
-                                  </p:childTnLst>
-                                </p:cTn>
-                              </p:par>
-                              <p:par>
-                                <p:cTn id="39" presetID="1" presetClass="exit" presetSubtype="0" fill="hold" grpId="0" nodeType="withEffect">
-                                  <p:stCondLst>
-                                    <p:cond delay="0"/>
-                                  </p:stCondLst>
-                                  <p:childTnLst>
-                                    <p:set>
-                                      <p:cBhvr>
-                                        <p:cTn id="40" dur="1" fill="hold">
-                                          <p:stCondLst>
-                                            <p:cond delay="0"/>
-                                          </p:stCondLst>
-                                        </p:cTn>
-                                        <p:tgtEl>
-                                          <p:spTgt spid="42"/>
-                                        </p:tgtEl>
-                                        <p:attrNameLst>
-                                          <p:attrName>style.visibility</p:attrName>
-                                        </p:attrNameLst>
-                                      </p:cBhvr>
-                                      <p:to>
-                                        <p:strVal val="hidden"/>
-                                      </p:to>
-                                    </p:set>
-                                  </p:childTnLst>
-                                </p:cTn>
-                              </p:par>
-                              <p:par>
-                                <p:cTn id="41" presetID="1" presetClass="exit" presetSubtype="0" fill="hold" grpId="0" nodeType="withEffect">
-                                  <p:stCondLst>
-                                    <p:cond delay="0"/>
-                                  </p:stCondLst>
-                                  <p:childTnLst>
-                                    <p:set>
-                                      <p:cBhvr>
-                                        <p:cTn id="42" dur="1" fill="hold">
-                                          <p:stCondLst>
-                                            <p:cond delay="0"/>
-                                          </p:stCondLst>
-                                        </p:cTn>
-                                        <p:tgtEl>
                                           <p:spTgt spid="43"/>
                                         </p:tgtEl>
                                         <p:attrNameLst>
@@ -5640,8 +5394,53 @@
                                   </p:childTnLst>
                                 </p:cTn>
                               </p:par>
+                            </p:childTnLst>
+                          </p:cTn>
+                        </p:par>
+                      </p:childTnLst>
+                    </p:cTn>
+                  </p:par>
+                  <p:par>
+                    <p:cTn id="39" fill="hold">
+                      <p:stCondLst>
+                        <p:cond delay="indefinite"/>
+                      </p:stCondLst>
+                      <p:childTnLst>
+                        <p:par>
+                          <p:cTn id="40" fill="hold">
+                            <p:stCondLst>
+                              <p:cond delay="0"/>
+                            </p:stCondLst>
+                            <p:childTnLst>
                               <p:par>
-                                <p:cTn id="43" presetID="1" presetClass="exit" presetSubtype="0" fill="hold" grpId="0" nodeType="withEffect">
+                                <p:cTn id="41" presetID="1" presetClass="entr" presetSubtype="0" fill="hold" grpId="0" nodeType="clickEffect">
+                                  <p:stCondLst>
+                                    <p:cond delay="0"/>
+                                  </p:stCondLst>
+                                  <p:childTnLst>
+                                    <p:set>
+                                      <p:cBhvr>
+                                        <p:cTn id="42" dur="1" fill="hold">
+                                          <p:stCondLst>
+                                            <p:cond delay="0"/>
+                                          </p:stCondLst>
+                                        </p:cTn>
+                                        <p:tgtEl>
+                                          <p:spTgt spid="45"/>
+                                        </p:tgtEl>
+                                        <p:attrNameLst>
+                                          <p:attrName>style.visibility</p:attrName>
+                                        </p:attrNameLst>
+                                      </p:cBhvr>
+                                      <p:to>
+                                        <p:strVal val="visible"/>
+                                      </p:to>
+                                    </p:set>
+                                  </p:childTnLst>
+                                </p:cTn>
+                              </p:par>
+                              <p:par>
+                                <p:cTn id="43" presetID="1" presetClass="exit" presetSubtype="0" fill="hold" grpId="1" nodeType="withEffect">
                                   <p:stCondLst>
                                     <p:cond delay="0"/>
                                   </p:stCondLst>
@@ -5654,7 +5453,7 @@
                                           </p:stCondLst>
                                         </p:cTn>
                                         <p:tgtEl>
-                                          <p:spTgt spid="44"/>
+                                          <p:spTgt spid="45"/>
                                         </p:tgtEl>
                                         <p:attrNameLst>
                                           <p:attrName>style.visibility</p:attrName>
@@ -5699,7 +5498,7 @@
                                           </p:stCondLst>
                                         </p:cTn>
                                         <p:tgtEl>
-                                          <p:spTgt spid="45"/>
+                                          <p:spTgt spid="46"/>
                                         </p:tgtEl>
                                         <p:attrNameLst>
                                           <p:attrName>style.visibility</p:attrName>
@@ -5726,7 +5525,7 @@
                                           </p:stCondLst>
                                         </p:cTn>
                                         <p:tgtEl>
-                                          <p:spTgt spid="45"/>
+                                          <p:spTgt spid="46"/>
                                         </p:tgtEl>
                                         <p:attrNameLst>
                                           <p:attrName>style.visibility</p:attrName>
@@ -5739,39 +5538,21 @@
                                   </p:childTnLst>
                                 </p:cTn>
                               </p:par>
-                            </p:childTnLst>
-                          </p:cTn>
-                        </p:par>
-                      </p:childTnLst>
-                    </p:cTn>
-                  </p:par>
-                  <p:par>
-                    <p:cTn id="51" fill="hold">
-                      <p:stCondLst>
-                        <p:cond delay="indefinite"/>
-                      </p:stCondLst>
-                      <p:childTnLst>
-                        <p:par>
-                          <p:cTn id="52" fill="hold">
-                            <p:stCondLst>
-                              <p:cond delay="0"/>
-                            </p:stCondLst>
-                            <p:childTnLst>
                               <p:par>
-                                <p:cTn id="53" presetID="1" presetClass="entr" presetSubtype="0" fill="hold" grpId="0" nodeType="clickEffect">
+                                <p:cTn id="51" presetID="1" presetClass="entr" presetSubtype="0" fill="hold" grpId="0" nodeType="withEffect">
                                   <p:stCondLst>
                                     <p:cond delay="0"/>
                                   </p:stCondLst>
                                   <p:childTnLst>
                                     <p:set>
                                       <p:cBhvr>
-                                        <p:cTn id="54" dur="1" fill="hold">
+                                        <p:cTn id="52" dur="1" fill="hold">
                                           <p:stCondLst>
                                             <p:cond delay="0"/>
                                           </p:stCondLst>
                                         </p:cTn>
                                         <p:tgtEl>
-                                          <p:spTgt spid="46"/>
+                                          <p:spTgt spid="47"/>
                                         </p:tgtEl>
                                         <p:attrNameLst>
                                           <p:attrName>style.visibility</p:attrName>
@@ -5785,7 +5566,34 @@
                                 </p:cTn>
                               </p:par>
                               <p:par>
-                                <p:cTn id="55" presetID="1" presetClass="exit" presetSubtype="0" fill="hold" grpId="1" nodeType="withEffect">
+                                <p:cTn id="53" presetID="1" presetClass="exit" presetSubtype="0" fill="hold" grpId="1" nodeType="withEffect">
+                                  <p:stCondLst>
+                                    <p:cond delay="0"/>
+                                  </p:stCondLst>
+                                  <p:childTnLst>
+                                    <p:set>
+                                      <p:cBhvr>
+                                        <p:cTn id="54" dur="1" fill="hold">
+                                          <p:stCondLst>
+                                            <p:cond delay="0"/>
+                                          </p:stCondLst>
+                                        </p:cTn>
+                                        <p:tgtEl>
+                                          <p:spTgt spid="47"/>
+                                        </p:tgtEl>
+                                        <p:attrNameLst>
+                                          <p:attrName>style.visibility</p:attrName>
+                                        </p:attrNameLst>
+                                      </p:cBhvr>
+                                      <p:to>
+                                        <p:strVal val="hidden"/>
+                                      </p:to>
+                                    </p:set>
+                                  </p:childTnLst>
+                                </p:cTn>
+                              </p:par>
+                              <p:par>
+                                <p:cTn id="55" presetID="1" presetClass="exit" presetSubtype="0" fill="hold" grpId="0" nodeType="withEffect">
                                   <p:stCondLst>
                                     <p:cond delay="0"/>
                                   </p:stCondLst>
@@ -5798,7 +5606,7 @@
                                           </p:stCondLst>
                                         </p:cTn>
                                         <p:tgtEl>
-                                          <p:spTgt spid="46"/>
+                                          <p:spTgt spid="48"/>
                                         </p:tgtEl>
                                         <p:attrNameLst>
                                           <p:attrName>style.visibility</p:attrName>
@@ -5825,7 +5633,7 @@
                                           </p:stCondLst>
                                         </p:cTn>
                                         <p:tgtEl>
-                                          <p:spTgt spid="47"/>
+                                          <p:spTgt spid="51"/>
                                         </p:tgtEl>
                                         <p:attrNameLst>
                                           <p:attrName>style.visibility</p:attrName>
@@ -5852,7 +5660,7 @@
                                           </p:stCondLst>
                                         </p:cTn>
                                         <p:tgtEl>
-                                          <p:spTgt spid="47"/>
+                                          <p:spTgt spid="51"/>
                                         </p:tgtEl>
                                         <p:attrNameLst>
                                           <p:attrName>style.visibility</p:attrName>
@@ -5879,87 +5687,6 @@
                                           </p:stCondLst>
                                         </p:cTn>
                                         <p:tgtEl>
-                                          <p:spTgt spid="48"/>
-                                        </p:tgtEl>
-                                        <p:attrNameLst>
-                                          <p:attrName>style.visibility</p:attrName>
-                                        </p:attrNameLst>
-                                      </p:cBhvr>
-                                      <p:to>
-                                        <p:strVal val="hidden"/>
-                                      </p:to>
-                                    </p:set>
-                                  </p:childTnLst>
-                                </p:cTn>
-                              </p:par>
-                              <p:par>
-                                <p:cTn id="63" presetID="1" presetClass="entr" presetSubtype="0" fill="hold" grpId="0" nodeType="withEffect">
-                                  <p:stCondLst>
-                                    <p:cond delay="0"/>
-                                  </p:stCondLst>
-                                  <p:childTnLst>
-                                    <p:set>
-                                      <p:cBhvr>
-                                        <p:cTn id="64" dur="1" fill="hold">
-                                          <p:stCondLst>
-                                            <p:cond delay="0"/>
-                                          </p:stCondLst>
-                                        </p:cTn>
-                                        <p:tgtEl>
-                                          <p:spTgt spid="51"/>
-                                        </p:tgtEl>
-                                        <p:attrNameLst>
-                                          <p:attrName>style.visibility</p:attrName>
-                                        </p:attrNameLst>
-                                      </p:cBhvr>
-                                      <p:to>
-                                        <p:strVal val="visible"/>
-                                      </p:to>
-                                    </p:set>
-                                  </p:childTnLst>
-                                </p:cTn>
-                              </p:par>
-                              <p:par>
-                                <p:cTn id="65" presetID="1" presetClass="exit" presetSubtype="0" fill="hold" grpId="1" nodeType="withEffect">
-                                  <p:stCondLst>
-                                    <p:cond delay="0"/>
-                                  </p:stCondLst>
-                                  <p:childTnLst>
-                                    <p:set>
-                                      <p:cBhvr>
-                                        <p:cTn id="66" dur="1" fill="hold">
-                                          <p:stCondLst>
-                                            <p:cond delay="0"/>
-                                          </p:stCondLst>
-                                        </p:cTn>
-                                        <p:tgtEl>
-                                          <p:spTgt spid="51"/>
-                                        </p:tgtEl>
-                                        <p:attrNameLst>
-                                          <p:attrName>style.visibility</p:attrName>
-                                        </p:attrNameLst>
-                                      </p:cBhvr>
-                                      <p:to>
-                                        <p:strVal val="hidden"/>
-                                      </p:to>
-                                    </p:set>
-                                  </p:childTnLst>
-                                </p:cTn>
-                              </p:par>
-                              <p:par>
-                                <p:cTn id="67" presetID="1" presetClass="exit" presetSubtype="0" fill="hold" grpId="0" nodeType="withEffect">
-                                  <p:stCondLst>
-                                    <p:cond delay="0"/>
-                                  </p:stCondLst>
-                                  <p:childTnLst>
-                                    <p:set>
-                                      <p:cBhvr>
-                                        <p:cTn id="68" dur="1" fill="hold">
-                                          <p:stCondLst>
-                                            <p:cond delay="0"/>
-                                          </p:stCondLst>
-                                        </p:cTn>
-                                        <p:tgtEl>
                                           <p:spTgt spid="52"/>
                                         </p:tgtEl>
                                         <p:attrNameLst>
@@ -5974,20 +5701,20 @@
                                 </p:cTn>
                               </p:par>
                               <p:par>
-                                <p:cTn id="69" presetID="1" presetClass="exit" presetSubtype="0" fill="hold" grpId="0" nodeType="withEffect">
+                                <p:cTn id="63" presetID="1" presetClass="exit" presetSubtype="0" fill="hold" grpId="0" nodeType="withEffect">
                                   <p:stCondLst>
                                     <p:cond delay="0"/>
                                   </p:stCondLst>
                                   <p:childTnLst>
                                     <p:set>
                                       <p:cBhvr>
-                                        <p:cTn id="70" dur="1" fill="hold">
+                                        <p:cTn id="64" dur="1" fill="hold">
                                           <p:stCondLst>
                                             <p:cond delay="0"/>
                                           </p:stCondLst>
                                         </p:cTn>
                                         <p:tgtEl>
-                                          <p:spTgt spid="53"/>
+                                          <p:spTgt spid="30"/>
                                         </p:tgtEl>
                                         <p:attrNameLst>
                                           <p:attrName>style.visibility</p:attrName>
@@ -6001,20 +5728,20 @@
                                 </p:cTn>
                               </p:par>
                               <p:par>
-                                <p:cTn id="71" presetID="1" presetClass="exit" presetSubtype="0" fill="hold" grpId="0" nodeType="withEffect">
+                                <p:cTn id="65" presetID="1" presetClass="exit" presetSubtype="0" fill="hold" grpId="0" nodeType="withEffect">
                                   <p:stCondLst>
                                     <p:cond delay="0"/>
                                   </p:stCondLst>
                                   <p:childTnLst>
                                     <p:set>
                                       <p:cBhvr>
-                                        <p:cTn id="72" dur="1" fill="hold">
+                                        <p:cTn id="66" dur="1" fill="hold">
                                           <p:stCondLst>
                                             <p:cond delay="0"/>
                                           </p:stCondLst>
                                         </p:cTn>
                                         <p:tgtEl>
-                                          <p:spTgt spid="30"/>
+                                          <p:spTgt spid="31"/>
                                         </p:tgtEl>
                                         <p:attrNameLst>
                                           <p:attrName>style.visibility</p:attrName>
@@ -6057,7 +5784,6 @@
     <p:bldLst>
       <p:bldP spid="5" grpId="0" animBg="1"/>
       <p:bldP spid="6" grpId="0" animBg="1"/>
-      <p:bldP spid="17" grpId="0" animBg="1"/>
       <p:bldP spid="18" grpId="0" animBg="1"/>
       <p:bldP spid="19" grpId="0" animBg="1"/>
       <p:bldP spid="20" grpId="0" animBg="1"/>
@@ -6071,10 +5797,8 @@
       <p:bldP spid="33" grpId="0" animBg="1"/>
       <p:bldP spid="34" grpId="0" animBg="1"/>
       <p:bldP spid="38" grpId="0"/>
-      <p:bldP spid="40" grpId="0" animBg="1"/>
       <p:bldP spid="42" grpId="0" animBg="1"/>
       <p:bldP spid="43" grpId="0" animBg="1"/>
-      <p:bldP spid="44" grpId="0" animBg="1"/>
       <p:bldP spid="45" grpId="0" animBg="1"/>
       <p:bldP spid="45" grpId="1" animBg="1"/>
       <p:bldP spid="46" grpId="0" animBg="1"/>
@@ -6085,8 +5809,8 @@
       <p:bldP spid="51" grpId="0"/>
       <p:bldP spid="51" grpId="1"/>
       <p:bldP spid="52" grpId="0" animBg="1"/>
-      <p:bldP spid="53" grpId="0" animBg="1"/>
       <p:bldP spid="30" grpId="0" animBg="1"/>
+      <p:bldP spid="31" grpId="0" animBg="1"/>
     </p:bldLst>
   </p:timing>
 </p:sld>

</xml_diff>

<commit_message>
Resize font for images
</commit_message>
<xml_diff>
--- a/docs/slides/Clear.pptx
+++ b/docs/slides/Clear.pptx
@@ -208,7 +208,7 @@
           <a:p>
             <a:fld id="{0BAC29A3-F74A-4A0E-BAC1-D5DFC749CF00}" type="datetimeFigureOut">
               <a:rPr lang="en-SG" smtClean="0"/>
-              <a:t>5/4/2020</a:t>
+              <a:t>9/4/2020</a:t>
             </a:fld>
             <a:endParaRPr lang="en-SG"/>
           </a:p>
@@ -757,7 +757,7 @@
           <a:p>
             <a:fld id="{9B83C82E-27F5-4045-82EE-E026C617D232}" type="datetimeFigureOut">
               <a:rPr lang="en-SG" smtClean="0"/>
-              <a:t>5/4/2020</a:t>
+              <a:t>9/4/2020</a:t>
             </a:fld>
             <a:endParaRPr lang="en-SG"/>
           </a:p>
@@ -927,7 +927,7 @@
           <a:p>
             <a:fld id="{9B83C82E-27F5-4045-82EE-E026C617D232}" type="datetimeFigureOut">
               <a:rPr lang="en-SG" smtClean="0"/>
-              <a:t>5/4/2020</a:t>
+              <a:t>9/4/2020</a:t>
             </a:fld>
             <a:endParaRPr lang="en-SG"/>
           </a:p>
@@ -1107,7 +1107,7 @@
           <a:p>
             <a:fld id="{9B83C82E-27F5-4045-82EE-E026C617D232}" type="datetimeFigureOut">
               <a:rPr lang="en-SG" smtClean="0"/>
-              <a:t>5/4/2020</a:t>
+              <a:t>9/4/2020</a:t>
             </a:fld>
             <a:endParaRPr lang="en-SG"/>
           </a:p>
@@ -1277,7 +1277,7 @@
           <a:p>
             <a:fld id="{9B83C82E-27F5-4045-82EE-E026C617D232}" type="datetimeFigureOut">
               <a:rPr lang="en-SG" smtClean="0"/>
-              <a:t>5/4/2020</a:t>
+              <a:t>9/4/2020</a:t>
             </a:fld>
             <a:endParaRPr lang="en-SG"/>
           </a:p>
@@ -1523,7 +1523,7 @@
           <a:p>
             <a:fld id="{9B83C82E-27F5-4045-82EE-E026C617D232}" type="datetimeFigureOut">
               <a:rPr lang="en-SG" smtClean="0"/>
-              <a:t>5/4/2020</a:t>
+              <a:t>9/4/2020</a:t>
             </a:fld>
             <a:endParaRPr lang="en-SG"/>
           </a:p>
@@ -1811,7 +1811,7 @@
           <a:p>
             <a:fld id="{9B83C82E-27F5-4045-82EE-E026C617D232}" type="datetimeFigureOut">
               <a:rPr lang="en-SG" smtClean="0"/>
-              <a:t>5/4/2020</a:t>
+              <a:t>9/4/2020</a:t>
             </a:fld>
             <a:endParaRPr lang="en-SG"/>
           </a:p>
@@ -2233,7 +2233,7 @@
           <a:p>
             <a:fld id="{9B83C82E-27F5-4045-82EE-E026C617D232}" type="datetimeFigureOut">
               <a:rPr lang="en-SG" smtClean="0"/>
-              <a:t>5/4/2020</a:t>
+              <a:t>9/4/2020</a:t>
             </a:fld>
             <a:endParaRPr lang="en-SG"/>
           </a:p>
@@ -2351,7 +2351,7 @@
           <a:p>
             <a:fld id="{9B83C82E-27F5-4045-82EE-E026C617D232}" type="datetimeFigureOut">
               <a:rPr lang="en-SG" smtClean="0"/>
-              <a:t>5/4/2020</a:t>
+              <a:t>9/4/2020</a:t>
             </a:fld>
             <a:endParaRPr lang="en-SG"/>
           </a:p>
@@ -2446,7 +2446,7 @@
           <a:p>
             <a:fld id="{9B83C82E-27F5-4045-82EE-E026C617D232}" type="datetimeFigureOut">
               <a:rPr lang="en-SG" smtClean="0"/>
-              <a:t>5/4/2020</a:t>
+              <a:t>9/4/2020</a:t>
             </a:fld>
             <a:endParaRPr lang="en-SG"/>
           </a:p>
@@ -2723,7 +2723,7 @@
           <a:p>
             <a:fld id="{9B83C82E-27F5-4045-82EE-E026C617D232}" type="datetimeFigureOut">
               <a:rPr lang="en-SG" smtClean="0"/>
-              <a:t>5/4/2020</a:t>
+              <a:t>9/4/2020</a:t>
             </a:fld>
             <a:endParaRPr lang="en-SG"/>
           </a:p>
@@ -2976,7 +2976,7 @@
           <a:p>
             <a:fld id="{9B83C82E-27F5-4045-82EE-E026C617D232}" type="datetimeFigureOut">
               <a:rPr lang="en-SG" smtClean="0"/>
-              <a:t>5/4/2020</a:t>
+              <a:t>9/4/2020</a:t>
             </a:fld>
             <a:endParaRPr lang="en-SG"/>
           </a:p>
@@ -3189,7 +3189,7 @@
           <a:p>
             <a:fld id="{9B83C82E-27F5-4045-82EE-E026C617D232}" type="datetimeFigureOut">
               <a:rPr lang="en-SG" smtClean="0"/>
-              <a:t>5/4/2020</a:t>
+              <a:t>9/4/2020</a:t>
             </a:fld>
             <a:endParaRPr lang="en-SG"/>
           </a:p>
@@ -3795,7 +3795,7 @@
         <p:spPr bwMode="auto">
           <a:xfrm>
             <a:off x="6026594" y="4026550"/>
-            <a:ext cx="1000462" cy="338554"/>
+            <a:ext cx="1000462" cy="323165"/>
           </a:xfrm>
           <a:prstGeom prst="rect">
             <a:avLst/>
@@ -3822,11 +3822,11 @@
               <a:buNone/>
             </a:pPr>
             <a:r>
-              <a:rPr lang="en-SG" sz="1600" i="1" dirty="0" err="1"/>
+              <a:rPr lang="en-SG" sz="1500" i="1" dirty="0" err="1"/>
               <a:t>clearList</a:t>
             </a:r>
             <a:r>
-              <a:rPr lang="en-SG" sz="1600" i="1" dirty="0"/>
+              <a:rPr lang="en-SG" sz="1500" i="1" dirty="0"/>
               <a:t>()</a:t>
             </a:r>
             <a:endParaRPr lang="en-US" sz="1500" i="1" dirty="0"/>
@@ -4754,15 +4754,14 @@
           <a:p>
             <a:pPr algn="ctr"/>
             <a:r>
-              <a:rPr lang="en-SG" sz="1300" dirty="0">
-                <a:latin typeface="Calibri"/>
+              <a:rPr lang="en-SG" sz="1500" dirty="0">
                 <a:ea typeface="Calibri"/>
                 <a:cs typeface="Calibri"/>
                 <a:sym typeface="Calibri"/>
               </a:rPr>
               <a:t>:Duke</a:t>
             </a:r>
-            <a:endParaRPr sz="1300" dirty="0"/>
+            <a:endParaRPr sz="1500" dirty="0"/>
           </a:p>
         </p:txBody>
       </p:sp>
@@ -4835,24 +4834,23 @@
           <a:p>
             <a:pPr algn="ctr"/>
             <a:r>
-              <a:rPr lang="en" sz="1300" dirty="0">
-                <a:latin typeface="Calibri"/>
+              <a:rPr lang="en" sz="1500" dirty="0">
                 <a:ea typeface="Calibri"/>
                 <a:cs typeface="Calibri"/>
                 <a:sym typeface="Calibri"/>
               </a:rPr>
               <a:t>:Parser</a:t>
             </a:r>
-            <a:endParaRPr sz="1300" dirty="0"/>
-          </a:p>
-        </p:txBody>
-      </p:sp>
-      <p:sp>
-        <p:nvSpPr>
-          <p:cNvPr id="35" name="Google Shape;62;p14">
+            <a:endParaRPr sz="1500" dirty="0"/>
+          </a:p>
+        </p:txBody>
+      </p:sp>
+      <p:sp>
+        <p:nvSpPr>
+          <p:cNvPr id="36" name="Google Shape;62;p14">
             <a:extLst>
               <a:ext uri="{FF2B5EF4-FFF2-40B4-BE49-F238E27FC236}">
-                <a16:creationId xmlns:a16="http://schemas.microsoft.com/office/drawing/2014/main" id="{1EDFE036-6BD4-43FE-8BB0-980C469CD72B}"/>
+                <a16:creationId xmlns:a16="http://schemas.microsoft.com/office/drawing/2014/main" id="{65E226EE-E524-4AEE-BDDC-86764557F9A9}"/>
               </a:ext>
             </a:extLst>
           </p:cNvPr>
@@ -4861,8 +4859,8 @@
         </p:nvSpPr>
         <p:spPr>
           <a:xfrm>
-            <a:off x="6645824" y="3112622"/>
-            <a:ext cx="1877199" cy="600145"/>
+            <a:off x="6588224" y="3023066"/>
+            <a:ext cx="2047974" cy="621958"/>
           </a:xfrm>
           <a:prstGeom prst="rect">
             <a:avLst/>
@@ -4914,54 +4912,40 @@
           </a:bodyPr>
           <a:lstStyle/>
           <a:p>
-            <a:pPr algn="ctr" defTabSz="872733">
-              <a:spcBef>
-                <a:spcPct val="50000"/>
-              </a:spcBef>
-              <a:buFont typeface="Wingdings" pitchFamily="2" charset="2"/>
-              <a:buNone/>
-            </a:pPr>
-            <a:endParaRPr lang="en-US" sz="1400" dirty="0">
+            <a:pPr algn="ctr"/>
+            <a:endParaRPr lang="en-US" sz="1500" kern="0" dirty="0">
               <a:solidFill>
                 <a:prstClr val="black"/>
               </a:solidFill>
             </a:endParaRPr>
           </a:p>
           <a:p>
-            <a:pPr algn="ctr" defTabSz="872733">
-              <a:spcBef>
-                <a:spcPct val="50000"/>
-              </a:spcBef>
-              <a:buFont typeface="Wingdings" pitchFamily="2" charset="2"/>
-              <a:buNone/>
-            </a:pPr>
-            <a:r>
-              <a:rPr lang="en-US" sz="1400" dirty="0" err="1">
+            <a:pPr algn="ctr"/>
+            <a:r>
+              <a:rPr lang="en-US" sz="1500" kern="0" dirty="0" err="1">
                 <a:solidFill>
                   <a:prstClr val="black"/>
                 </a:solidFill>
               </a:rPr>
               <a:t>items:ShoppingList</a:t>
             </a:r>
-            <a:endParaRPr lang="en-US" sz="1400" dirty="0">
+            <a:endParaRPr lang="en-US" sz="1500" kern="0" dirty="0">
               <a:solidFill>
                 <a:prstClr val="black"/>
               </a:solidFill>
             </a:endParaRPr>
           </a:p>
           <a:p>
-            <a:pPr algn="ctr" defTabSz="872733">
+            <a:pPr marL="0" marR="0" lvl="0" indent="0" algn="ctr" rtl="0">
               <a:spcBef>
-                <a:spcPct val="50000"/>
+                <a:spcPts val="0"/>
               </a:spcBef>
-              <a:buFont typeface="Wingdings" pitchFamily="2" charset="2"/>
+              <a:spcAft>
+                <a:spcPts val="0"/>
+              </a:spcAft>
               <a:buNone/>
             </a:pPr>
-            <a:endParaRPr lang="en-US" sz="1400" dirty="0">
-              <a:solidFill>
-                <a:prstClr val="black"/>
-              </a:solidFill>
-            </a:endParaRPr>
+            <a:endParaRPr sz="1500" dirty="0"/>
           </a:p>
         </p:txBody>
       </p:sp>

</xml_diff>